<commit_message>
improvment to pptx continue integration with training glove model
</commit_message>
<xml_diff>
--- a/mid_term.pptx
+++ b/mid_term.pptx
@@ -2,18 +2,20 @@
 <file path=ppt/presentation.xml><?xml version="1.0" encoding="utf-8"?>
 <p:presentation xmlns:a="http://schemas.openxmlformats.org/drawingml/2006/main" xmlns:r="http://schemas.openxmlformats.org/officeDocument/2006/relationships" xmlns:p="http://schemas.openxmlformats.org/presentationml/2006/main" saveSubsetFonts="1">
   <p:sldMasterIdLst>
-    <p:sldMasterId id="2147483648" r:id="rId1"/>
+    <p:sldMasterId id="2147483648" r:id="rId4"/>
   </p:sldMasterIdLst>
   <p:sldIdLst>
-    <p:sldId id="256" r:id="rId2"/>
-    <p:sldId id="258" r:id="rId3"/>
-    <p:sldId id="275" r:id="rId4"/>
-    <p:sldId id="274" r:id="rId5"/>
-    <p:sldId id="273" r:id="rId6"/>
-    <p:sldId id="264" r:id="rId7"/>
-    <p:sldId id="268" r:id="rId8"/>
-    <p:sldId id="263" r:id="rId9"/>
-    <p:sldId id="276" r:id="rId10"/>
+    <p:sldId id="256" r:id="rId5"/>
+    <p:sldId id="258" r:id="rId6"/>
+    <p:sldId id="275" r:id="rId7"/>
+    <p:sldId id="274" r:id="rId8"/>
+    <p:sldId id="273" r:id="rId9"/>
+    <p:sldId id="264" r:id="rId10"/>
+    <p:sldId id="268" r:id="rId11"/>
+    <p:sldId id="278" r:id="rId12"/>
+    <p:sldId id="277" r:id="rId13"/>
+    <p:sldId id="263" r:id="rId14"/>
+    <p:sldId id="276" r:id="rId15"/>
   </p:sldIdLst>
   <p:sldSz cx="12192000" cy="6858000"/>
   <p:notesSz cx="6858000" cy="9144000"/>
@@ -134,9 +136,7 @@
 <file path=ppt/revisionInfo.xml><?xml version="1.0" encoding="utf-8"?>
 <p1510:revInfo xmlns:a="http://schemas.openxmlformats.org/drawingml/2006/main" xmlns:r="http://schemas.openxmlformats.org/officeDocument/2006/relationships" xmlns:p1510="http://schemas.microsoft.com/office/powerpoint/2015/10/main">
   <p1510:revLst>
-    <p1510:client id="{10EA307C-83B4-CDF6-9875-23A74AC478ED}" v="750" dt="2022-08-08T17:56:27.161"/>
-    <p1510:client id="{7CC550E2-6DDB-4775-87B9-F16117655889}" v="159" dt="2022-08-08T17:07:15.468"/>
-    <p1510:client id="{C3D0970D-24F8-45A7-A150-6EB680454E5D}" v="126" dt="2022-08-08T15:39:03.920"/>
+    <p1510:client id="{987C1B17-4E27-4FB2-A41E-ED89AD65A6CC}" v="32" dt="2022-08-21T18:51:30.226"/>
   </p1510:revLst>
 </p1510:revInfo>
 </file>
@@ -290,7 +290,7 @@
           <a:p>
             <a:fld id="{78363832-F4F9-4F4D-9C74-BFFFF749447A}" type="datetimeFigureOut">
               <a:rPr lang="en-GB" smtClean="0"/>
-              <a:t>17/08/2022</a:t>
+              <a:t>21/08/2022</a:t>
             </a:fld>
             <a:endParaRPr lang="en-GB"/>
           </a:p>
@@ -490,7 +490,7 @@
           <a:p>
             <a:fld id="{78363832-F4F9-4F4D-9C74-BFFFF749447A}" type="datetimeFigureOut">
               <a:rPr lang="en-GB" smtClean="0"/>
-              <a:t>17/08/2022</a:t>
+              <a:t>21/08/2022</a:t>
             </a:fld>
             <a:endParaRPr lang="en-GB"/>
           </a:p>
@@ -700,7 +700,7 @@
           <a:p>
             <a:fld id="{78363832-F4F9-4F4D-9C74-BFFFF749447A}" type="datetimeFigureOut">
               <a:rPr lang="en-GB" smtClean="0"/>
-              <a:t>17/08/2022</a:t>
+              <a:t>21/08/2022</a:t>
             </a:fld>
             <a:endParaRPr lang="en-GB"/>
           </a:p>
@@ -900,7 +900,7 @@
           <a:p>
             <a:fld id="{78363832-F4F9-4F4D-9C74-BFFFF749447A}" type="datetimeFigureOut">
               <a:rPr lang="en-GB" smtClean="0"/>
-              <a:t>17/08/2022</a:t>
+              <a:t>21/08/2022</a:t>
             </a:fld>
             <a:endParaRPr lang="en-GB"/>
           </a:p>
@@ -1176,7 +1176,7 @@
           <a:p>
             <a:fld id="{78363832-F4F9-4F4D-9C74-BFFFF749447A}" type="datetimeFigureOut">
               <a:rPr lang="en-GB" smtClean="0"/>
-              <a:t>17/08/2022</a:t>
+              <a:t>21/08/2022</a:t>
             </a:fld>
             <a:endParaRPr lang="en-GB"/>
           </a:p>
@@ -1444,7 +1444,7 @@
           <a:p>
             <a:fld id="{78363832-F4F9-4F4D-9C74-BFFFF749447A}" type="datetimeFigureOut">
               <a:rPr lang="en-GB" smtClean="0"/>
-              <a:t>17/08/2022</a:t>
+              <a:t>21/08/2022</a:t>
             </a:fld>
             <a:endParaRPr lang="en-GB"/>
           </a:p>
@@ -1859,7 +1859,7 @@
           <a:p>
             <a:fld id="{78363832-F4F9-4F4D-9C74-BFFFF749447A}" type="datetimeFigureOut">
               <a:rPr lang="en-GB" smtClean="0"/>
-              <a:t>17/08/2022</a:t>
+              <a:t>21/08/2022</a:t>
             </a:fld>
             <a:endParaRPr lang="en-GB"/>
           </a:p>
@@ -2001,7 +2001,7 @@
           <a:p>
             <a:fld id="{78363832-F4F9-4F4D-9C74-BFFFF749447A}" type="datetimeFigureOut">
               <a:rPr lang="en-GB" smtClean="0"/>
-              <a:t>17/08/2022</a:t>
+              <a:t>21/08/2022</a:t>
             </a:fld>
             <a:endParaRPr lang="en-GB"/>
           </a:p>
@@ -2114,7 +2114,7 @@
           <a:p>
             <a:fld id="{78363832-F4F9-4F4D-9C74-BFFFF749447A}" type="datetimeFigureOut">
               <a:rPr lang="en-GB" smtClean="0"/>
-              <a:t>17/08/2022</a:t>
+              <a:t>21/08/2022</a:t>
             </a:fld>
             <a:endParaRPr lang="en-GB"/>
           </a:p>
@@ -2427,7 +2427,7 @@
           <a:p>
             <a:fld id="{78363832-F4F9-4F4D-9C74-BFFFF749447A}" type="datetimeFigureOut">
               <a:rPr lang="en-GB" smtClean="0"/>
-              <a:t>17/08/2022</a:t>
+              <a:t>21/08/2022</a:t>
             </a:fld>
             <a:endParaRPr lang="en-GB"/>
           </a:p>
@@ -2716,7 +2716,7 @@
           <a:p>
             <a:fld id="{78363832-F4F9-4F4D-9C74-BFFFF749447A}" type="datetimeFigureOut">
               <a:rPr lang="en-GB" smtClean="0"/>
-              <a:t>17/08/2022</a:t>
+              <a:t>21/08/2022</a:t>
             </a:fld>
             <a:endParaRPr lang="en-GB"/>
           </a:p>
@@ -2959,7 +2959,7 @@
           <a:p>
             <a:fld id="{78363832-F4F9-4F4D-9C74-BFFFF749447A}" type="datetimeFigureOut">
               <a:rPr lang="en-GB" smtClean="0"/>
-              <a:t>17/08/2022</a:t>
+              <a:t>21/08/2022</a:t>
             </a:fld>
             <a:endParaRPr lang="en-GB"/>
           </a:p>
@@ -3792,6 +3792,253 @@
 </p:sld>
 </file>
 
+<file path=ppt/slides/slide10.xml><?xml version="1.0" encoding="utf-8"?>
+<p:sld xmlns:a="http://schemas.openxmlformats.org/drawingml/2006/main" xmlns:r="http://schemas.openxmlformats.org/officeDocument/2006/relationships" xmlns:p="http://schemas.openxmlformats.org/presentationml/2006/main">
+  <p:cSld>
+    <p:spTree>
+      <p:nvGrpSpPr>
+        <p:cNvPr id="1" name=""/>
+        <p:cNvGrpSpPr/>
+        <p:nvPr/>
+      </p:nvGrpSpPr>
+      <p:grpSpPr>
+        <a:xfrm>
+          <a:off x="0" y="0"/>
+          <a:ext cx="0" cy="0"/>
+          <a:chOff x="0" y="0"/>
+          <a:chExt cx="0" cy="0"/>
+        </a:xfrm>
+      </p:grpSpPr>
+      <p:sp>
+        <p:nvSpPr>
+          <p:cNvPr id="2" name="Title 1">
+            <a:extLst>
+              <a:ext uri="{FF2B5EF4-FFF2-40B4-BE49-F238E27FC236}">
+                <a16:creationId xmlns:a16="http://schemas.microsoft.com/office/drawing/2014/main" id="{B1B2157A-6E97-71AC-96AF-6A651C07C07F}"/>
+              </a:ext>
+            </a:extLst>
+          </p:cNvPr>
+          <p:cNvSpPr>
+            <a:spLocks noGrp="1"/>
+          </p:cNvSpPr>
+          <p:nvPr>
+            <p:ph type="title"/>
+          </p:nvPr>
+        </p:nvSpPr>
+        <p:spPr/>
+        <p:txBody>
+          <a:bodyPr/>
+          <a:lstStyle/>
+          <a:p>
+            <a:r>
+              <a:rPr lang="en-US" b="1" dirty="0"/>
+              <a:t>Future work</a:t>
+            </a:r>
+            <a:endParaRPr lang="en-GB" b="1" dirty="0"/>
+          </a:p>
+        </p:txBody>
+      </p:sp>
+      <p:sp>
+        <p:nvSpPr>
+          <p:cNvPr id="6" name="Content Placeholder 2">
+            <a:extLst>
+              <a:ext uri="{FF2B5EF4-FFF2-40B4-BE49-F238E27FC236}">
+                <a16:creationId xmlns:a16="http://schemas.microsoft.com/office/drawing/2014/main" id="{511D9F8B-3BF0-CEF2-E14C-36FAE1E77A6B}"/>
+              </a:ext>
+            </a:extLst>
+          </p:cNvPr>
+          <p:cNvSpPr>
+            <a:spLocks noGrp="1"/>
+          </p:cNvSpPr>
+          <p:nvPr>
+            <p:ph idx="1"/>
+          </p:nvPr>
+        </p:nvSpPr>
+        <p:spPr>
+          <a:xfrm>
+            <a:off x="838200" y="1825625"/>
+            <a:ext cx="10515600" cy="4351338"/>
+          </a:xfrm>
+        </p:spPr>
+        <p:txBody>
+          <a:bodyPr>
+            <a:noAutofit/>
+          </a:bodyPr>
+          <a:lstStyle/>
+          <a:p>
+            <a:pPr>
+              <a:lnSpc>
+                <a:spcPct val="100000"/>
+              </a:lnSpc>
+              <a:spcBef>
+                <a:spcPts val="1200"/>
+              </a:spcBef>
+              <a:spcAft>
+                <a:spcPts val="1200"/>
+              </a:spcAft>
+            </a:pPr>
+            <a:r>
+              <a:rPr lang="en-US" sz="3200" dirty="0">
+                <a:solidFill>
+                  <a:srgbClr val="000000"/>
+                </a:solidFill>
+                <a:ea typeface="Calibri" panose="020F0502020204030204" pitchFamily="34" charset="0"/>
+              </a:rPr>
+              <a:t>Initial results </a:t>
+            </a:r>
+          </a:p>
+          <a:p>
+            <a:pPr>
+              <a:lnSpc>
+                <a:spcPct val="100000"/>
+              </a:lnSpc>
+              <a:spcBef>
+                <a:spcPts val="1200"/>
+              </a:spcBef>
+              <a:spcAft>
+                <a:spcPts val="1200"/>
+              </a:spcAft>
+            </a:pPr>
+            <a:r>
+              <a:rPr lang="en-US" sz="3200" dirty="0">
+                <a:solidFill>
+                  <a:srgbClr val="000000"/>
+                </a:solidFill>
+                <a:ea typeface="Calibri" panose="020F0502020204030204" pitchFamily="34" charset="0"/>
+              </a:rPr>
+              <a:t>H</a:t>
+            </a:r>
+            <a:r>
+              <a:rPr lang="en-US" sz="3200" dirty="0">
+                <a:solidFill>
+                  <a:srgbClr val="000000"/>
+                </a:solidFill>
+                <a:effectLst/>
+                <a:ea typeface="Calibri" panose="020F0502020204030204" pitchFamily="34" charset="0"/>
+              </a:rPr>
+              <a:t>yperparameter tuning  via cross validation</a:t>
+            </a:r>
+          </a:p>
+          <a:p>
+            <a:pPr marL="0" indent="0">
+              <a:lnSpc>
+                <a:spcPct val="100000"/>
+              </a:lnSpc>
+              <a:spcBef>
+                <a:spcPts val="1200"/>
+              </a:spcBef>
+              <a:spcAft>
+                <a:spcPts val="1200"/>
+              </a:spcAft>
+              <a:buNone/>
+            </a:pPr>
+            <a:endParaRPr lang="en-US" sz="3200" dirty="0"/>
+          </a:p>
+          <a:p>
+            <a:pPr>
+              <a:lnSpc>
+                <a:spcPct val="100000"/>
+              </a:lnSpc>
+            </a:pPr>
+            <a:endParaRPr lang="en-US" sz="3200" dirty="0"/>
+          </a:p>
+          <a:p>
+            <a:pPr>
+              <a:lnSpc>
+                <a:spcPct val="100000"/>
+              </a:lnSpc>
+            </a:pPr>
+            <a:endParaRPr lang="en-US" sz="3200" dirty="0"/>
+          </a:p>
+          <a:p>
+            <a:pPr>
+              <a:lnSpc>
+                <a:spcPct val="100000"/>
+              </a:lnSpc>
+            </a:pPr>
+            <a:endParaRPr lang="en-US" sz="3200" dirty="0"/>
+          </a:p>
+        </p:txBody>
+      </p:sp>
+    </p:spTree>
+    <p:extLst>
+      <p:ext uri="{BB962C8B-B14F-4D97-AF65-F5344CB8AC3E}">
+        <p14:creationId xmlns:p14="http://schemas.microsoft.com/office/powerpoint/2010/main" val="3711738761"/>
+      </p:ext>
+    </p:extLst>
+  </p:cSld>
+  <p:clrMapOvr>
+    <a:masterClrMapping/>
+  </p:clrMapOvr>
+</p:sld>
+</file>
+
+<file path=ppt/slides/slide11.xml><?xml version="1.0" encoding="utf-8"?>
+<p:sld xmlns:a="http://schemas.openxmlformats.org/drawingml/2006/main" xmlns:r="http://schemas.openxmlformats.org/officeDocument/2006/relationships" xmlns:p="http://schemas.openxmlformats.org/presentationml/2006/main">
+  <p:cSld>
+    <p:spTree>
+      <p:nvGrpSpPr>
+        <p:cNvPr id="1" name=""/>
+        <p:cNvGrpSpPr/>
+        <p:nvPr/>
+      </p:nvGrpSpPr>
+      <p:grpSpPr>
+        <a:xfrm>
+          <a:off x="0" y="0"/>
+          <a:ext cx="0" cy="0"/>
+          <a:chOff x="0" y="0"/>
+          <a:chExt cx="0" cy="0"/>
+        </a:xfrm>
+      </p:grpSpPr>
+      <p:sp>
+        <p:nvSpPr>
+          <p:cNvPr id="2" name="Title 1">
+            <a:extLst>
+              <a:ext uri="{FF2B5EF4-FFF2-40B4-BE49-F238E27FC236}">
+                <a16:creationId xmlns:a16="http://schemas.microsoft.com/office/drawing/2014/main" id="{B1B2157A-6E97-71AC-96AF-6A651C07C07F}"/>
+              </a:ext>
+            </a:extLst>
+          </p:cNvPr>
+          <p:cNvSpPr>
+            <a:spLocks noGrp="1"/>
+          </p:cNvSpPr>
+          <p:nvPr>
+            <p:ph type="title"/>
+          </p:nvPr>
+        </p:nvSpPr>
+        <p:spPr>
+          <a:xfrm>
+            <a:off x="3777133" y="2226055"/>
+            <a:ext cx="4637734" cy="2405889"/>
+          </a:xfrm>
+        </p:spPr>
+        <p:txBody>
+          <a:bodyPr>
+            <a:normAutofit/>
+          </a:bodyPr>
+          <a:lstStyle/>
+          <a:p>
+            <a:r>
+              <a:rPr lang="en-US" sz="6600" b="1" dirty="0"/>
+              <a:t>Questions?</a:t>
+            </a:r>
+            <a:endParaRPr lang="en-GB" sz="6600" b="1" dirty="0"/>
+          </a:p>
+        </p:txBody>
+      </p:sp>
+    </p:spTree>
+    <p:extLst>
+      <p:ext uri="{BB962C8B-B14F-4D97-AF65-F5344CB8AC3E}">
+        <p14:creationId xmlns:p14="http://schemas.microsoft.com/office/powerpoint/2010/main" val="1778032345"/>
+      </p:ext>
+    </p:extLst>
+  </p:cSld>
+  <p:clrMapOvr>
+    <a:masterClrMapping/>
+  </p:clrMapOvr>
+</p:sld>
+</file>
+
 <file path=ppt/slides/slide2.xml><?xml version="1.0" encoding="utf-8"?>
 <p:sld xmlns:a="http://schemas.openxmlformats.org/drawingml/2006/main" xmlns:r="http://schemas.openxmlformats.org/officeDocument/2006/relationships" xmlns:p="http://schemas.openxmlformats.org/presentationml/2006/main">
   <p:cSld>
@@ -4933,7 +5180,7 @@
           <a:p>
             <a:r>
               <a:rPr lang="en-US" b="1" dirty="0"/>
-              <a:t>Continuous Bag-of-Words vs Skip-Gram</a:t>
+              <a:t>Word2Vec </a:t>
             </a:r>
             <a:endParaRPr lang="en-GB" b="1" dirty="0"/>
           </a:p>
@@ -4941,10 +5188,10 @@
       </p:sp>
       <p:pic>
         <p:nvPicPr>
-          <p:cNvPr id="1026" name="Picture 2" descr="Word2Vec Training Models">
-            <a:extLst>
-              <a:ext uri="{FF2B5EF4-FFF2-40B4-BE49-F238E27FC236}">
-                <a16:creationId xmlns:a16="http://schemas.microsoft.com/office/drawing/2014/main" id="{84325EB4-EAE8-BD1B-086C-E8EE96A2146E}"/>
+          <p:cNvPr id="3" name="Picture 2" descr="context-window-skip-grams">
+            <a:extLst>
+              <a:ext uri="{FF2B5EF4-FFF2-40B4-BE49-F238E27FC236}">
+                <a16:creationId xmlns:a16="http://schemas.microsoft.com/office/drawing/2014/main" id="{BFD266F6-1679-B437-502C-3D8035AB3D7B}"/>
               </a:ext>
             </a:extLst>
           </p:cNvPr>
@@ -4968,8 +5215,55 @@
         </p:blipFill>
         <p:spPr bwMode="auto">
           <a:xfrm>
-            <a:off x="838200" y="1268361"/>
-            <a:ext cx="8746125" cy="5331348"/>
+            <a:off x="335218" y="2860449"/>
+            <a:ext cx="6083798" cy="3632426"/>
+          </a:xfrm>
+          <a:prstGeom prst="rect">
+            <a:avLst/>
+          </a:prstGeom>
+          <a:noFill/>
+          <a:extLst>
+            <a:ext uri="{909E8E84-426E-40DD-AFC4-6F175D3DCCD1}">
+              <a14:hiddenFill xmlns:a14="http://schemas.microsoft.com/office/drawing/2010/main">
+                <a:solidFill>
+                  <a:srgbClr val="FFFFFF"/>
+                </a:solidFill>
+              </a14:hiddenFill>
+            </a:ext>
+          </a:extLst>
+        </p:spPr>
+      </p:pic>
+      <p:pic>
+        <p:nvPicPr>
+          <p:cNvPr id="1028" name="Picture 4" descr="word2vec-architecture">
+            <a:extLst>
+              <a:ext uri="{FF2B5EF4-FFF2-40B4-BE49-F238E27FC236}">
+                <a16:creationId xmlns:a16="http://schemas.microsoft.com/office/drawing/2014/main" id="{DF01BB4F-9A99-1EA4-9B38-D058DDF4A08D}"/>
+              </a:ext>
+            </a:extLst>
+          </p:cNvPr>
+          <p:cNvPicPr>
+            <a:picLocks noChangeAspect="1" noChangeArrowheads="1"/>
+          </p:cNvPicPr>
+          <p:nvPr/>
+        </p:nvPicPr>
+        <p:blipFill>
+          <a:blip r:embed="rId3">
+            <a:extLst>
+              <a:ext uri="{28A0092B-C50C-407E-A947-70E740481C1C}">
+                <a14:useLocalDpi xmlns:a14="http://schemas.microsoft.com/office/drawing/2010/main" val="0"/>
+              </a:ext>
+            </a:extLst>
+          </a:blip>
+          <a:srcRect/>
+          <a:stretch>
+            <a:fillRect/>
+          </a:stretch>
+        </p:blipFill>
+        <p:spPr bwMode="auto">
+          <a:xfrm>
+            <a:off x="5210284" y="106927"/>
+            <a:ext cx="6896400" cy="4307757"/>
           </a:xfrm>
           <a:prstGeom prst="rect">
             <a:avLst/>
@@ -5416,9 +5710,16 @@
             <p:ph type="title"/>
           </p:nvPr>
         </p:nvSpPr>
-        <p:spPr/>
-        <p:txBody>
-          <a:bodyPr/>
+        <p:spPr>
+          <a:xfrm>
+            <a:off x="838200" y="365125"/>
+            <a:ext cx="10901516" cy="1325563"/>
+          </a:xfrm>
+        </p:spPr>
+        <p:txBody>
+          <a:bodyPr>
+            <a:normAutofit fontScale="90000"/>
+          </a:bodyPr>
           <a:lstStyle/>
           <a:p>
             <a:r>
@@ -5431,13 +5732,22 @@
               <a:t>Past work </a:t>
             </a:r>
             <a:r>
-              <a:rPr lang="en-US" sz="4400" b="1" dirty="0" err="1">
+              <a:rPr lang="he-IL" b="1" dirty="0">
                 <a:solidFill>
                   <a:prstClr val="black"/>
                 </a:solidFill>
                 <a:cs typeface="Arial" panose="020B0604020202020204" pitchFamily="34" charset="0"/>
               </a:rPr>
-              <a:t>comperition</a:t>
+              <a:t>–</a:t>
+            </a:r>
+            <a:r>
+              <a:rPr lang="en-US" b="1" dirty="0">
+                <a:solidFill>
+                  <a:prstClr val="black"/>
+                </a:solidFill>
+                <a:cs typeface="Arial" panose="020B0604020202020204" pitchFamily="34" charset="0"/>
+              </a:rPr>
+              <a:t> “Comparing word2vec and GloVe for Automatic Measurement of MWE Compositionality”</a:t>
             </a:r>
             <a:endParaRPr lang="en-GB" b="1" dirty="0"/>
           </a:p>
@@ -5461,8 +5771,8 @@
         </p:nvSpPr>
         <p:spPr>
           <a:xfrm>
-            <a:off x="838200" y="1825625"/>
-            <a:ext cx="8534400" cy="4351338"/>
+            <a:off x="838199" y="1825625"/>
+            <a:ext cx="11128513" cy="4351338"/>
           </a:xfrm>
         </p:spPr>
         <p:txBody>
@@ -5473,55 +5783,49 @@
           <a:p>
             <a:r>
               <a:rPr lang="en-US" sz="3200" dirty="0"/>
-              <a:t>Modified CNN </a:t>
+              <a:t>Hypothesis</a:t>
+            </a:r>
+          </a:p>
+          <a:p>
+            <a:pPr lvl="1"/>
+            <a:r>
+              <a:rPr lang="en-US" sz="2800" dirty="0"/>
+              <a:t>  Multiword expressions word vector are like its components word vectors</a:t>
             </a:r>
           </a:p>
           <a:p>
             <a:r>
               <a:rPr lang="en-US" sz="3200" dirty="0"/>
-              <a:t>Meaningful first layer</a:t>
+              <a:t>Datasets</a:t>
+            </a:r>
+          </a:p>
+          <a:p>
+            <a:pPr lvl="1"/>
+            <a:r>
+              <a:rPr lang="en-US" sz="2800" dirty="0"/>
+              <a:t>SIMP20=simple Wikipedia dataset of 2020</a:t>
+            </a:r>
+          </a:p>
+          <a:p>
+            <a:pPr lvl="1"/>
+            <a:r>
+              <a:rPr lang="en-US" sz="2800" dirty="0"/>
+              <a:t>EN20_10P= 10% of all Wikipedia dataset from 2020</a:t>
             </a:r>
           </a:p>
           <a:p>
             <a:r>
               <a:rPr lang="en-US" sz="3200" dirty="0"/>
-              <a:t>Band pass filter (</a:t>
-            </a:r>
-            <a:r>
-              <a:rPr lang="en-US" sz="3200" dirty="0" err="1"/>
-              <a:t>freq</a:t>
-            </a:r>
-            <a:r>
-              <a:rPr lang="en-US" sz="3200" dirty="0"/>
-              <a:t>)</a:t>
-            </a:r>
-            <a:br>
-              <a:rPr lang="en-US" sz="3200" dirty="0"/>
-            </a:br>
-            <a:r>
-              <a:rPr lang="en-US" sz="3200" dirty="0"/>
-              <a:t> by </a:t>
-            </a:r>
-            <a:r>
-              <a:rPr lang="en-US" sz="3200" dirty="0" err="1"/>
-              <a:t>sinc</a:t>
-            </a:r>
-            <a:r>
-              <a:rPr lang="en-US" sz="3200" dirty="0"/>
-              <a:t> functions (time)</a:t>
-            </a:r>
-          </a:p>
-          <a:p>
-            <a:r>
-              <a:rPr lang="en-US" sz="3200" dirty="0"/>
-              <a:t>Regular CNN Pipeline</a:t>
-            </a:r>
-          </a:p>
-          <a:p>
-            <a:endParaRPr lang="en-US" sz="3200" dirty="0"/>
-          </a:p>
-          <a:p>
-            <a:endParaRPr lang="en-US" sz="3200" dirty="0"/>
+              <a:t>Categories </a:t>
+            </a:r>
+            <a:r>
+              <a:rPr lang="en-US" dirty="0"/>
+              <a:t>(the true labels were created by humans)</a:t>
+            </a:r>
+          </a:p>
+          <a:p>
+            <a:pPr lvl="1"/>
+            <a:endParaRPr lang="en-US" sz="2800" dirty="0"/>
           </a:p>
         </p:txBody>
       </p:sp>
@@ -5539,8 +5843,8 @@
         </p:nvSpPr>
         <p:spPr>
           <a:xfrm>
-            <a:off x="-57150" y="6607175"/>
-            <a:ext cx="12211050" cy="276999"/>
+            <a:off x="-57150" y="6636992"/>
+            <a:ext cx="12211050" cy="430887"/>
           </a:xfrm>
           <a:prstGeom prst="rect">
             <a:avLst/>
@@ -5554,126 +5858,16 @@
           <a:lstStyle/>
           <a:p>
             <a:r>
-              <a:rPr lang="en-US" sz="1200" u="none" strike="noStrike" dirty="0" err="1">
-                <a:solidFill>
-                  <a:srgbClr val="222222"/>
-                </a:solidFill>
+              <a:rPr lang="en-US" sz="1100" u="none" strike="noStrike" dirty="0">
                 <a:effectLst/>
-                <a:highlight>
-                  <a:srgbClr val="FFFFFF"/>
-                </a:highlight>
                 <a:latin typeface="Calibri" panose="020F0502020204030204" pitchFamily="34" charset="0"/>
                 <a:ea typeface="Calibri" panose="020F0502020204030204" pitchFamily="34" charset="0"/>
-                <a:cs typeface="Calibri" panose="020F0502020204030204" pitchFamily="34" charset="0"/>
               </a:rPr>
-              <a:t>Ravanelli</a:t>
-            </a:r>
-            <a:r>
-              <a:rPr lang="en-US" sz="1200" u="none" strike="noStrike" dirty="0">
-                <a:solidFill>
-                  <a:srgbClr val="222222"/>
-                </a:solidFill>
-                <a:effectLst/>
-                <a:highlight>
-                  <a:srgbClr val="FFFFFF"/>
-                </a:highlight>
-                <a:latin typeface="Calibri" panose="020F0502020204030204" pitchFamily="34" charset="0"/>
-                <a:ea typeface="Calibri" panose="020F0502020204030204" pitchFamily="34" charset="0"/>
-                <a:cs typeface="Calibri" panose="020F0502020204030204" pitchFamily="34" charset="0"/>
-              </a:rPr>
-              <a:t>, M., &amp; </a:t>
-            </a:r>
-            <a:r>
-              <a:rPr lang="en-US" sz="1200" u="none" strike="noStrike" dirty="0" err="1">
-                <a:solidFill>
-                  <a:srgbClr val="222222"/>
-                </a:solidFill>
-                <a:effectLst/>
-                <a:highlight>
-                  <a:srgbClr val="FFFFFF"/>
-                </a:highlight>
-                <a:latin typeface="Calibri" panose="020F0502020204030204" pitchFamily="34" charset="0"/>
-                <a:ea typeface="Calibri" panose="020F0502020204030204" pitchFamily="34" charset="0"/>
-                <a:cs typeface="Calibri" panose="020F0502020204030204" pitchFamily="34" charset="0"/>
-              </a:rPr>
-              <a:t>Bengio</a:t>
-            </a:r>
-            <a:r>
-              <a:rPr lang="en-US" sz="1200" u="none" strike="noStrike" dirty="0">
-                <a:solidFill>
-                  <a:srgbClr val="222222"/>
-                </a:solidFill>
-                <a:effectLst/>
-                <a:highlight>
-                  <a:srgbClr val="FFFFFF"/>
-                </a:highlight>
-                <a:latin typeface="Calibri" panose="020F0502020204030204" pitchFamily="34" charset="0"/>
-                <a:ea typeface="Calibri" panose="020F0502020204030204" pitchFamily="34" charset="0"/>
-                <a:cs typeface="Calibri" panose="020F0502020204030204" pitchFamily="34" charset="0"/>
-              </a:rPr>
-              <a:t>, Y. (2018, December). Speaker recognition from raw waveform with </a:t>
-            </a:r>
-            <a:r>
-              <a:rPr lang="en-US" sz="1200" u="none" strike="noStrike" dirty="0" err="1">
-                <a:solidFill>
-                  <a:srgbClr val="222222"/>
-                </a:solidFill>
-                <a:effectLst/>
-                <a:highlight>
-                  <a:srgbClr val="FFFFFF"/>
-                </a:highlight>
-                <a:latin typeface="Calibri" panose="020F0502020204030204" pitchFamily="34" charset="0"/>
-                <a:ea typeface="Calibri" panose="020F0502020204030204" pitchFamily="34" charset="0"/>
-                <a:cs typeface="Calibri" panose="020F0502020204030204" pitchFamily="34" charset="0"/>
-              </a:rPr>
-              <a:t>sincnet</a:t>
-            </a:r>
-            <a:r>
-              <a:rPr lang="en-US" sz="1200" u="none" strike="noStrike" dirty="0">
-                <a:solidFill>
-                  <a:srgbClr val="222222"/>
-                </a:solidFill>
-                <a:effectLst/>
-                <a:highlight>
-                  <a:srgbClr val="FFFFFF"/>
-                </a:highlight>
-                <a:latin typeface="Calibri" panose="020F0502020204030204" pitchFamily="34" charset="0"/>
-                <a:ea typeface="Calibri" panose="020F0502020204030204" pitchFamily="34" charset="0"/>
-                <a:cs typeface="Calibri" panose="020F0502020204030204" pitchFamily="34" charset="0"/>
-              </a:rPr>
-              <a:t>. </a:t>
-            </a:r>
-            <a:r>
-              <a:rPr lang="he-IL" sz="1200" u="none" strike="noStrike" dirty="0">
-                <a:solidFill>
-                  <a:srgbClr val="222222"/>
-                </a:solidFill>
-                <a:effectLst/>
-                <a:highlight>
-                  <a:srgbClr val="FFFFFF"/>
-                </a:highlight>
-                <a:latin typeface="Calibri" panose="020F0502020204030204" pitchFamily="34" charset="0"/>
-                <a:ea typeface="Calibri" panose="020F0502020204030204" pitchFamily="34" charset="0"/>
-                <a:cs typeface="Calibri" panose="020F0502020204030204" pitchFamily="34" charset="0"/>
-              </a:rPr>
-              <a:t>In </a:t>
-            </a:r>
-            <a:r>
-              <a:rPr lang="he-IL" sz="1200" i="1" u="none" strike="noStrike" dirty="0">
-                <a:solidFill>
-                  <a:srgbClr val="222222"/>
-                </a:solidFill>
-                <a:effectLst/>
-                <a:highlight>
-                  <a:srgbClr val="FFFFFF"/>
-                </a:highlight>
-                <a:latin typeface="Calibri" panose="020F0502020204030204" pitchFamily="34" charset="0"/>
-                <a:ea typeface="Calibri" panose="020F0502020204030204" pitchFamily="34" charset="0"/>
-                <a:cs typeface="Calibri" panose="020F0502020204030204" pitchFamily="34" charset="0"/>
-              </a:rPr>
-              <a:t>2018 IEEE Spoken Language Technology Workshop (SLT)</a:t>
-            </a:r>
-            <a:endParaRPr lang="en-IL" sz="1200" u="none" strike="noStrike" dirty="0">
+              <a:t>Pickard, T. (2020, December). Comparing word2vec and glove for automatic measurement of MWE compositionality. In Proceedings of the Joint Workshop on Multiword Expressions and Electronic Lexicons </a:t>
+            </a:r>
+          </a:p>
+          <a:p>
+            <a:endParaRPr lang="en-IL" sz="1100" u="none" strike="noStrike" dirty="0">
               <a:effectLst/>
               <a:latin typeface="Calibri" panose="020F0502020204030204" pitchFamily="34" charset="0"/>
               <a:ea typeface="Calibri" panose="020F0502020204030204" pitchFamily="34" charset="0"/>
@@ -5681,6 +5875,444 @@
           </a:p>
         </p:txBody>
       </p:sp>
+      <p:graphicFrame>
+        <p:nvGraphicFramePr>
+          <p:cNvPr id="7" name="Table 7">
+            <a:extLst>
+              <a:ext uri="{FF2B5EF4-FFF2-40B4-BE49-F238E27FC236}">
+                <a16:creationId xmlns:a16="http://schemas.microsoft.com/office/drawing/2014/main" id="{728015F8-CE9D-9705-D7C9-117715435067}"/>
+              </a:ext>
+            </a:extLst>
+          </p:cNvPr>
+          <p:cNvGraphicFramePr>
+            <a:graphicFrameLocks noGrp="1"/>
+          </p:cNvGraphicFramePr>
+          <p:nvPr>
+            <p:extLst>
+              <p:ext uri="{D42A27DB-BD31-4B8C-83A1-F6EECF244321}">
+                <p14:modId xmlns:p14="http://schemas.microsoft.com/office/powerpoint/2010/main" val="2321980441"/>
+              </p:ext>
+            </p:extLst>
+          </p:nvPr>
+        </p:nvGraphicFramePr>
+        <p:xfrm>
+          <a:off x="1041397" y="5199380"/>
+          <a:ext cx="10312404" cy="1483360"/>
+        </p:xfrm>
+        <a:graphic>
+          <a:graphicData uri="http://schemas.openxmlformats.org/drawingml/2006/table">
+            <a:tbl>
+              <a:tblPr firstRow="1" bandRow="1">
+                <a:tableStyleId>{073A0DAA-6AF3-43AB-8588-CEC1D06C72B9}</a:tableStyleId>
+              </a:tblPr>
+              <a:tblGrid>
+                <a:gridCol w="1612350">
+                  <a:extLst>
+                    <a:ext uri="{9D8B030D-6E8A-4147-A177-3AD203B41FA5}">
+                      <a16:colId xmlns:a16="http://schemas.microsoft.com/office/drawing/2014/main" val="198279148"/>
+                    </a:ext>
+                  </a:extLst>
+                </a:gridCol>
+                <a:gridCol w="1825118">
+                  <a:extLst>
+                    <a:ext uri="{9D8B030D-6E8A-4147-A177-3AD203B41FA5}">
+                      <a16:colId xmlns:a16="http://schemas.microsoft.com/office/drawing/2014/main" val="3171802010"/>
+                    </a:ext>
+                  </a:extLst>
+                </a:gridCol>
+                <a:gridCol w="1718734">
+                  <a:extLst>
+                    <a:ext uri="{9D8B030D-6E8A-4147-A177-3AD203B41FA5}">
+                      <a16:colId xmlns:a16="http://schemas.microsoft.com/office/drawing/2014/main" val="1827215711"/>
+                    </a:ext>
+                  </a:extLst>
+                </a:gridCol>
+                <a:gridCol w="1718734">
+                  <a:extLst>
+                    <a:ext uri="{9D8B030D-6E8A-4147-A177-3AD203B41FA5}">
+                      <a16:colId xmlns:a16="http://schemas.microsoft.com/office/drawing/2014/main" val="3089581234"/>
+                    </a:ext>
+                  </a:extLst>
+                </a:gridCol>
+                <a:gridCol w="1718734">
+                  <a:extLst>
+                    <a:ext uri="{9D8B030D-6E8A-4147-A177-3AD203B41FA5}">
+                      <a16:colId xmlns:a16="http://schemas.microsoft.com/office/drawing/2014/main" val="3377657747"/>
+                    </a:ext>
+                  </a:extLst>
+                </a:gridCol>
+                <a:gridCol w="1718734">
+                  <a:extLst>
+                    <a:ext uri="{9D8B030D-6E8A-4147-A177-3AD203B41FA5}">
+                      <a16:colId xmlns:a16="http://schemas.microsoft.com/office/drawing/2014/main" val="1124283984"/>
+                    </a:ext>
+                  </a:extLst>
+                </a:gridCol>
+              </a:tblGrid>
+              <a:tr h="370840">
+                <a:tc>
+                  <a:txBody>
+                    <a:bodyPr/>
+                    <a:lstStyle/>
+                    <a:p>
+                      <a:endParaRPr lang="en-IL"/>
+                    </a:p>
+                  </a:txBody>
+                  <a:tcPr/>
+                </a:tc>
+                <a:tc>
+                  <a:txBody>
+                    <a:bodyPr/>
+                    <a:lstStyle/>
+                    <a:p>
+                      <a:r>
+                        <a:rPr lang="en-US" dirty="0"/>
+                        <a:t>F_ENC</a:t>
+                      </a:r>
+                      <a:endParaRPr lang="en-IL" dirty="0"/>
+                    </a:p>
+                  </a:txBody>
+                  <a:tcPr/>
+                </a:tc>
+                <a:tc>
+                  <a:txBody>
+                    <a:bodyPr/>
+                    <a:lstStyle/>
+                    <a:p>
+                      <a:r>
+                        <a:rPr lang="en-US" dirty="0"/>
+                        <a:t>R_ENC</a:t>
+                      </a:r>
+                      <a:endParaRPr lang="en-IL" dirty="0"/>
+                    </a:p>
+                  </a:txBody>
+                  <a:tcPr/>
+                </a:tc>
+                <a:tc>
+                  <a:txBody>
+                    <a:bodyPr/>
+                    <a:lstStyle/>
+                    <a:p>
+                      <a:r>
+                        <a:rPr lang="en-US" dirty="0"/>
+                        <a:t>MC_VPC</a:t>
+                      </a:r>
+                      <a:endParaRPr lang="en-IL" dirty="0"/>
+                    </a:p>
+                  </a:txBody>
+                  <a:tcPr/>
+                </a:tc>
+                <a:tc>
+                  <a:txBody>
+                    <a:bodyPr/>
+                    <a:lstStyle/>
+                    <a:p>
+                      <a:r>
+                        <a:rPr lang="en-US" dirty="0"/>
+                        <a:t>D_ADJN</a:t>
+                      </a:r>
+                      <a:endParaRPr lang="en-IL" dirty="0"/>
+                    </a:p>
+                  </a:txBody>
+                  <a:tcPr/>
+                </a:tc>
+                <a:tc>
+                  <a:txBody>
+                    <a:bodyPr/>
+                    <a:lstStyle/>
+                    <a:p>
+                      <a:r>
+                        <a:rPr lang="en-US" dirty="0"/>
+                        <a:t>MC_VN</a:t>
+                      </a:r>
+                      <a:endParaRPr lang="en-IL" dirty="0"/>
+                    </a:p>
+                  </a:txBody>
+                  <a:tcPr/>
+                </a:tc>
+                <a:extLst>
+                  <a:ext uri="{0D108BD9-81ED-4DB2-BD59-A6C34878D82A}">
+                    <a16:rowId xmlns:a16="http://schemas.microsoft.com/office/drawing/2014/main" val="1451929024"/>
+                  </a:ext>
+                </a:extLst>
+              </a:tr>
+              <a:tr h="370840">
+                <a:tc>
+                  <a:txBody>
+                    <a:bodyPr/>
+                    <a:lstStyle/>
+                    <a:p>
+                      <a:r>
+                        <a:rPr lang="en-US" dirty="0"/>
+                        <a:t>meaning</a:t>
+                      </a:r>
+                      <a:endParaRPr lang="en-IL" dirty="0"/>
+                    </a:p>
+                  </a:txBody>
+                  <a:tcPr/>
+                </a:tc>
+                <a:tc>
+                  <a:txBody>
+                    <a:bodyPr/>
+                    <a:lstStyle/>
+                    <a:p>
+                      <a:r>
+                        <a:rPr lang="en-US" dirty="0"/>
+                        <a:t>nominal</a:t>
+                      </a:r>
+                      <a:endParaRPr lang="en-IL" dirty="0"/>
+                    </a:p>
+                  </a:txBody>
+                  <a:tcPr/>
+                </a:tc>
+                <a:tc>
+                  <a:txBody>
+                    <a:bodyPr/>
+                    <a:lstStyle/>
+                    <a:p>
+                      <a:r>
+                        <a:rPr lang="en-US" dirty="0"/>
+                        <a:t>noun</a:t>
+                      </a:r>
+                      <a:endParaRPr lang="en-IL" dirty="0"/>
+                    </a:p>
+                  </a:txBody>
+                  <a:tcPr/>
+                </a:tc>
+                <a:tc>
+                  <a:txBody>
+                    <a:bodyPr/>
+                    <a:lstStyle/>
+                    <a:p>
+                      <a:r>
+                        <a:rPr lang="en-US" dirty="0"/>
+                        <a:t>Verb-particle</a:t>
+                      </a:r>
+                      <a:endParaRPr lang="en-IL" dirty="0"/>
+                    </a:p>
+                  </a:txBody>
+                  <a:tcPr/>
+                </a:tc>
+                <a:tc>
+                  <a:txBody>
+                    <a:bodyPr/>
+                    <a:lstStyle/>
+                    <a:p>
+                      <a:r>
+                        <a:rPr lang="en-US" dirty="0"/>
+                        <a:t>Adjective-noun</a:t>
+                      </a:r>
+                      <a:endParaRPr lang="en-IL" dirty="0"/>
+                    </a:p>
+                  </a:txBody>
+                  <a:tcPr/>
+                </a:tc>
+                <a:tc>
+                  <a:txBody>
+                    <a:bodyPr/>
+                    <a:lstStyle/>
+                    <a:p>
+                      <a:r>
+                        <a:rPr lang="en-US" dirty="0"/>
+                        <a:t>Verb-object</a:t>
+                      </a:r>
+                      <a:endParaRPr lang="en-IL" dirty="0"/>
+                    </a:p>
+                  </a:txBody>
+                  <a:tcPr/>
+                </a:tc>
+                <a:extLst>
+                  <a:ext uri="{0D108BD9-81ED-4DB2-BD59-A6C34878D82A}">
+                    <a16:rowId xmlns:a16="http://schemas.microsoft.com/office/drawing/2014/main" val="3131580770"/>
+                  </a:ext>
+                </a:extLst>
+              </a:tr>
+              <a:tr h="370840">
+                <a:tc>
+                  <a:txBody>
+                    <a:bodyPr/>
+                    <a:lstStyle/>
+                    <a:p>
+                      <a:r>
+                        <a:rPr lang="en-US" dirty="0"/>
+                        <a:t>size</a:t>
+                      </a:r>
+                      <a:endParaRPr lang="en-IL" dirty="0"/>
+                    </a:p>
+                  </a:txBody>
+                  <a:tcPr/>
+                </a:tc>
+                <a:tc>
+                  <a:txBody>
+                    <a:bodyPr/>
+                    <a:lstStyle/>
+                    <a:p>
+                      <a:r>
+                        <a:rPr lang="en-US" dirty="0"/>
+                        <a:t>1042 compounds</a:t>
+                      </a:r>
+                      <a:endParaRPr lang="en-IL" dirty="0"/>
+                    </a:p>
+                  </a:txBody>
+                  <a:tcPr/>
+                </a:tc>
+                <a:tc>
+                  <a:txBody>
+                    <a:bodyPr/>
+                    <a:lstStyle/>
+                    <a:p>
+                      <a:r>
+                        <a:rPr lang="en-US" dirty="0"/>
+                        <a:t>90 compounds</a:t>
+                      </a:r>
+                      <a:endParaRPr lang="en-IL" dirty="0"/>
+                    </a:p>
+                  </a:txBody>
+                  <a:tcPr/>
+                </a:tc>
+                <a:tc>
+                  <a:txBody>
+                    <a:bodyPr/>
+                    <a:lstStyle/>
+                    <a:p>
+                      <a:r>
+                        <a:rPr lang="en-US" dirty="0"/>
+                        <a:t>116 pairs</a:t>
+                      </a:r>
+                      <a:endParaRPr lang="en-IL" dirty="0"/>
+                    </a:p>
+                  </a:txBody>
+                  <a:tcPr/>
+                </a:tc>
+                <a:tc>
+                  <a:txBody>
+                    <a:bodyPr/>
+                    <a:lstStyle/>
+                    <a:p>
+                      <a:r>
+                        <a:rPr lang="en-US" dirty="0"/>
+                        <a:t>135 compounds</a:t>
+                      </a:r>
+                      <a:endParaRPr lang="en-IL" dirty="0"/>
+                    </a:p>
+                  </a:txBody>
+                  <a:tcPr/>
+                </a:tc>
+                <a:tc>
+                  <a:txBody>
+                    <a:bodyPr/>
+                    <a:lstStyle/>
+                    <a:p>
+                      <a:r>
+                        <a:rPr lang="en-US" dirty="0"/>
+                        <a:t>638 pairs</a:t>
+                      </a:r>
+                      <a:endParaRPr lang="en-IL" dirty="0"/>
+                    </a:p>
+                  </a:txBody>
+                  <a:tcPr/>
+                </a:tc>
+                <a:extLst>
+                  <a:ext uri="{0D108BD9-81ED-4DB2-BD59-A6C34878D82A}">
+                    <a16:rowId xmlns:a16="http://schemas.microsoft.com/office/drawing/2014/main" val="2409835667"/>
+                  </a:ext>
+                </a:extLst>
+              </a:tr>
+              <a:tr h="370840">
+                <a:tc>
+                  <a:txBody>
+                    <a:bodyPr/>
+                    <a:lstStyle/>
+                    <a:p>
+                      <a:r>
+                        <a:rPr lang="en-US" dirty="0"/>
+                        <a:t>Ex.</a:t>
+                      </a:r>
+                      <a:endParaRPr lang="en-IL" dirty="0"/>
+                    </a:p>
+                  </a:txBody>
+                  <a:tcPr/>
+                </a:tc>
+                <a:tc>
+                  <a:txBody>
+                    <a:bodyPr/>
+                    <a:lstStyle/>
+                    <a:p>
+                      <a:r>
+                        <a:rPr lang="en-US" dirty="0"/>
+                        <a:t>Greenhouse gas</a:t>
+                      </a:r>
+                      <a:endParaRPr lang="en-IL" dirty="0"/>
+                    </a:p>
+                  </a:txBody>
+                  <a:tcPr/>
+                </a:tc>
+                <a:tc>
+                  <a:txBody>
+                    <a:bodyPr/>
+                    <a:lstStyle/>
+                    <a:p>
+                      <a:r>
+                        <a:rPr lang="en-US" dirty="0"/>
+                        <a:t>Ivory tower</a:t>
+                      </a:r>
+                      <a:endParaRPr lang="en-IL" dirty="0"/>
+                    </a:p>
+                  </a:txBody>
+                  <a:tcPr/>
+                </a:tc>
+                <a:tc>
+                  <a:txBody>
+                    <a:bodyPr/>
+                    <a:lstStyle/>
+                    <a:p>
+                      <a:r>
+                        <a:rPr lang="en-US" dirty="0"/>
+                        <a:t>Lie down</a:t>
+                      </a:r>
+                      <a:endParaRPr lang="en-IL" dirty="0"/>
+                    </a:p>
+                  </a:txBody>
+                  <a:tcPr/>
+                </a:tc>
+                <a:tc>
+                  <a:txBody>
+                    <a:bodyPr/>
+                    <a:lstStyle/>
+                    <a:p>
+                      <a:r>
+                        <a:rPr lang="en-US" dirty="0"/>
+                        <a:t>Blue chip</a:t>
+                      </a:r>
+                      <a:endParaRPr lang="en-IL" dirty="0"/>
+                    </a:p>
+                  </a:txBody>
+                  <a:tcPr/>
+                </a:tc>
+                <a:tc>
+                  <a:txBody>
+                    <a:bodyPr/>
+                    <a:lstStyle/>
+                    <a:p>
+                      <a:r>
+                        <a:rPr lang="en-US" dirty="0"/>
+                        <a:t>Take root</a:t>
+                      </a:r>
+                      <a:endParaRPr lang="en-IL" dirty="0"/>
+                    </a:p>
+                  </a:txBody>
+                  <a:tcPr/>
+                </a:tc>
+                <a:extLst>
+                  <a:ext uri="{0D108BD9-81ED-4DB2-BD59-A6C34878D82A}">
+                    <a16:rowId xmlns:a16="http://schemas.microsoft.com/office/drawing/2014/main" val="599988518"/>
+                  </a:ext>
+                </a:extLst>
+              </a:tr>
+            </a:tbl>
+          </a:graphicData>
+        </a:graphic>
+      </p:graphicFrame>
     </p:spTree>
     <p:extLst>
       <p:ext uri="{BB962C8B-B14F-4D97-AF65-F5344CB8AC3E}">
@@ -5727,232 +6359,129 @@
             <p:ph type="title"/>
           </p:nvPr>
         </p:nvSpPr>
-        <p:spPr/>
-        <p:txBody>
-          <a:bodyPr/>
-          <a:lstStyle/>
-          <a:p>
-            <a:r>
-              <a:rPr lang="en-US" b="1" dirty="0"/>
-              <a:t>Future work</a:t>
-            </a:r>
-            <a:endParaRPr lang="en-GB" b="1" dirty="0"/>
-          </a:p>
-        </p:txBody>
-      </p:sp>
-      <p:sp>
-        <p:nvSpPr>
-          <p:cNvPr id="6" name="Content Placeholder 2">
-            <a:extLst>
-              <a:ext uri="{FF2B5EF4-FFF2-40B4-BE49-F238E27FC236}">
-                <a16:creationId xmlns:a16="http://schemas.microsoft.com/office/drawing/2014/main" id="{511D9F8B-3BF0-CEF2-E14C-36FAE1E77A6B}"/>
-              </a:ext>
-            </a:extLst>
-          </p:cNvPr>
-          <p:cNvSpPr>
-            <a:spLocks noGrp="1"/>
-          </p:cNvSpPr>
-          <p:nvPr>
-            <p:ph idx="1"/>
-          </p:nvPr>
-        </p:nvSpPr>
         <p:spPr>
           <a:xfrm>
-            <a:off x="838200" y="1825625"/>
-            <a:ext cx="10515600" cy="4351338"/>
+            <a:off x="838200" y="365125"/>
+            <a:ext cx="10901516" cy="1325563"/>
           </a:xfrm>
         </p:spPr>
         <p:txBody>
           <a:bodyPr>
-            <a:noAutofit/>
+            <a:normAutofit fontScale="90000"/>
           </a:bodyPr>
           <a:lstStyle/>
           <a:p>
-            <a:pPr>
-              <a:lnSpc>
-                <a:spcPct val="100000"/>
-              </a:lnSpc>
-              <a:spcBef>
-                <a:spcPts val="1200"/>
-              </a:spcBef>
-              <a:spcAft>
-                <a:spcPts val="1200"/>
-              </a:spcAft>
-            </a:pPr>
-            <a:r>
-              <a:rPr lang="en-US" sz="3200" dirty="0">
+            <a:r>
+              <a:rPr lang="en-US" sz="4400" b="1" dirty="0">
                 <a:solidFill>
-                  <a:srgbClr val="000000"/>
+                  <a:prstClr val="black"/>
                 </a:solidFill>
+                <a:cs typeface="Arial" panose="020B0604020202020204" pitchFamily="34" charset="0"/>
+              </a:rPr>
+              <a:t>Past work </a:t>
+            </a:r>
+            <a:r>
+              <a:rPr lang="he-IL" b="1" dirty="0">
+                <a:solidFill>
+                  <a:prstClr val="black"/>
+                </a:solidFill>
+                <a:cs typeface="Arial" panose="020B0604020202020204" pitchFamily="34" charset="0"/>
+              </a:rPr>
+              <a:t>–</a:t>
+            </a:r>
+            <a:r>
+              <a:rPr lang="en-US" b="1" dirty="0">
+                <a:solidFill>
+                  <a:prstClr val="black"/>
+                </a:solidFill>
+                <a:cs typeface="Arial" panose="020B0604020202020204" pitchFamily="34" charset="0"/>
+              </a:rPr>
+              <a:t> “Comparing word2vec and GloVe for Automatic Measurement of MWE Compositionality”</a:t>
+            </a:r>
+            <a:endParaRPr lang="en-GB" b="1" dirty="0"/>
+          </a:p>
+        </p:txBody>
+      </p:sp>
+      <p:pic>
+        <p:nvPicPr>
+          <p:cNvPr id="9" name="Picture 8">
+            <a:extLst>
+              <a:ext uri="{FF2B5EF4-FFF2-40B4-BE49-F238E27FC236}">
+                <a16:creationId xmlns:a16="http://schemas.microsoft.com/office/drawing/2014/main" id="{5C65B8B2-C2FD-4E75-CB6D-F6B53D09CE63}"/>
+              </a:ext>
+            </a:extLst>
+          </p:cNvPr>
+          <p:cNvPicPr>
+            <a:picLocks noChangeAspect="1"/>
+          </p:cNvPicPr>
+          <p:nvPr/>
+        </p:nvPicPr>
+        <p:blipFill>
+          <a:blip r:embed="rId2"/>
+          <a:stretch>
+            <a:fillRect/>
+          </a:stretch>
+        </p:blipFill>
+        <p:spPr>
+          <a:xfrm>
+            <a:off x="1115253" y="1471134"/>
+            <a:ext cx="9866243" cy="5021741"/>
+          </a:xfrm>
+          <a:prstGeom prst="rect">
+            <a:avLst/>
+          </a:prstGeom>
+        </p:spPr>
+      </p:pic>
+      <p:sp>
+        <p:nvSpPr>
+          <p:cNvPr id="10" name="TextBox 9">
+            <a:extLst>
+              <a:ext uri="{FF2B5EF4-FFF2-40B4-BE49-F238E27FC236}">
+                <a16:creationId xmlns:a16="http://schemas.microsoft.com/office/drawing/2014/main" id="{E0E521BA-FABF-7C08-AE2D-8EF6FE3E25B7}"/>
+              </a:ext>
+            </a:extLst>
+          </p:cNvPr>
+          <p:cNvSpPr txBox="1"/>
+          <p:nvPr/>
+        </p:nvSpPr>
+        <p:spPr>
+          <a:xfrm>
+            <a:off x="-57150" y="6636992"/>
+            <a:ext cx="12211050" cy="430887"/>
+          </a:xfrm>
+          <a:prstGeom prst="rect">
+            <a:avLst/>
+          </a:prstGeom>
+          <a:noFill/>
+        </p:spPr>
+        <p:txBody>
+          <a:bodyPr wrap="square" rtlCol="0">
+            <a:spAutoFit/>
+          </a:bodyPr>
+          <a:lstStyle/>
+          <a:p>
+            <a:r>
+              <a:rPr lang="en-US" sz="1100" u="none" strike="noStrike" dirty="0">
+                <a:effectLst/>
+                <a:latin typeface="Calibri" panose="020F0502020204030204" pitchFamily="34" charset="0"/>
                 <a:ea typeface="Calibri" panose="020F0502020204030204" pitchFamily="34" charset="0"/>
               </a:rPr>
-              <a:t>Initial results </a:t>
-            </a:r>
-          </a:p>
-          <a:p>
-            <a:pPr>
-              <a:lnSpc>
-                <a:spcPct val="100000"/>
-              </a:lnSpc>
-              <a:spcBef>
-                <a:spcPts val="1200"/>
-              </a:spcBef>
-              <a:spcAft>
-                <a:spcPts val="1200"/>
-              </a:spcAft>
-            </a:pPr>
-            <a:r>
-              <a:rPr lang="en-US" sz="3200" dirty="0">
-                <a:solidFill>
-                  <a:srgbClr val="000000"/>
-                </a:solidFill>
-                <a:ea typeface="Calibri" panose="020F0502020204030204" pitchFamily="34" charset="0"/>
-              </a:rPr>
-              <a:t>H</a:t>
-            </a:r>
-            <a:r>
-              <a:rPr lang="en-US" sz="3200" dirty="0">
-                <a:solidFill>
-                  <a:srgbClr val="000000"/>
-                </a:solidFill>
-                <a:effectLst/>
-                <a:ea typeface="Calibri" panose="020F0502020204030204" pitchFamily="34" charset="0"/>
-              </a:rPr>
-              <a:t>yperparameter tuning  via cross validation</a:t>
-            </a:r>
-          </a:p>
-          <a:p>
-            <a:pPr>
-              <a:lnSpc>
-                <a:spcPct val="100000"/>
-              </a:lnSpc>
-              <a:spcBef>
-                <a:spcPts val="1200"/>
-              </a:spcBef>
-              <a:spcAft>
-                <a:spcPts val="1200"/>
-              </a:spcAft>
-            </a:pPr>
-            <a:r>
-              <a:rPr lang="en-US" sz="3200" dirty="0">
-                <a:solidFill>
-                  <a:srgbClr val="000000"/>
-                </a:solidFill>
-                <a:effectLst/>
-                <a:ea typeface="Calibri" panose="020F0502020204030204" pitchFamily="34" charset="0"/>
-              </a:rPr>
-              <a:t>Data filtering rules – maximizing number of samples with small data variance</a:t>
-            </a:r>
-          </a:p>
-          <a:p>
-            <a:pPr>
-              <a:lnSpc>
-                <a:spcPct val="100000"/>
-              </a:lnSpc>
-              <a:spcBef>
-                <a:spcPts val="1200"/>
-              </a:spcBef>
-              <a:spcAft>
-                <a:spcPts val="1200"/>
-              </a:spcAft>
-            </a:pPr>
-            <a:r>
-              <a:rPr lang="en-US" sz="3200" dirty="0">
-                <a:solidFill>
-                  <a:srgbClr val="000000"/>
-                </a:solidFill>
-                <a:ea typeface="Calibri" panose="020F0502020204030204" pitchFamily="34" charset="0"/>
-              </a:rPr>
-              <a:t>S</a:t>
-            </a:r>
-            <a:r>
-              <a:rPr lang="en-US" sz="3200" dirty="0">
-                <a:solidFill>
-                  <a:srgbClr val="000000"/>
-                </a:solidFill>
-                <a:effectLst/>
-                <a:ea typeface="Calibri" panose="020F0502020204030204" pitchFamily="34" charset="0"/>
-              </a:rPr>
-              <a:t>plit long audio files with long silence periods</a:t>
-            </a:r>
-          </a:p>
-          <a:p>
-            <a:pPr>
-              <a:lnSpc>
-                <a:spcPct val="100000"/>
-              </a:lnSpc>
-              <a:spcBef>
-                <a:spcPts val="1200"/>
-              </a:spcBef>
-              <a:spcAft>
-                <a:spcPts val="1200"/>
-              </a:spcAft>
-            </a:pPr>
-            <a:r>
-              <a:rPr lang="en-US" sz="3200" dirty="0">
-                <a:solidFill>
-                  <a:srgbClr val="000000"/>
-                </a:solidFill>
-                <a:ea typeface="Calibri" panose="020F0502020204030204" pitchFamily="34" charset="0"/>
-              </a:rPr>
-              <a:t>U</a:t>
-            </a:r>
-            <a:r>
-              <a:rPr lang="en-US" sz="3200" dirty="0">
-                <a:solidFill>
-                  <a:srgbClr val="000000"/>
-                </a:solidFill>
-                <a:effectLst/>
-                <a:ea typeface="Calibri" panose="020F0502020204030204" pitchFamily="34" charset="0"/>
-              </a:rPr>
-              <a:t>p sampling the data of the third surgeon (“AM”)</a:t>
-            </a:r>
-          </a:p>
-          <a:p>
-            <a:pPr marL="0" indent="0">
-              <a:lnSpc>
-                <a:spcPct val="100000"/>
-              </a:lnSpc>
-              <a:spcBef>
-                <a:spcPts val="1200"/>
-              </a:spcBef>
-              <a:spcAft>
-                <a:spcPts val="1200"/>
-              </a:spcAft>
-              <a:buNone/>
-            </a:pPr>
-            <a:endParaRPr lang="en-US" sz="3200" dirty="0"/>
-          </a:p>
-          <a:p>
-            <a:pPr>
-              <a:lnSpc>
-                <a:spcPct val="100000"/>
-              </a:lnSpc>
-            </a:pPr>
-            <a:endParaRPr lang="en-US" sz="3200" dirty="0"/>
-          </a:p>
-          <a:p>
-            <a:pPr>
-              <a:lnSpc>
-                <a:spcPct val="100000"/>
-              </a:lnSpc>
-            </a:pPr>
-            <a:endParaRPr lang="en-US" sz="3200" dirty="0"/>
-          </a:p>
-          <a:p>
-            <a:pPr>
-              <a:lnSpc>
-                <a:spcPct val="100000"/>
-              </a:lnSpc>
-            </a:pPr>
-            <a:endParaRPr lang="en-US" sz="3200" dirty="0"/>
+              <a:t>Pickard, T. (2020, December). Comparing word2vec and glove for automatic measurement of MWE compositionality. In Proceedings of the Joint Workshop on Multiword Expressions and Electronic Lexicons </a:t>
+            </a:r>
+          </a:p>
+          <a:p>
+            <a:endParaRPr lang="en-IL" sz="1100" u="none" strike="noStrike" dirty="0">
+              <a:effectLst/>
+              <a:latin typeface="Calibri" panose="020F0502020204030204" pitchFamily="34" charset="0"/>
+              <a:ea typeface="Calibri" panose="020F0502020204030204" pitchFamily="34" charset="0"/>
+            </a:endParaRPr>
           </a:p>
         </p:txBody>
       </p:sp>
     </p:spTree>
     <p:extLst>
       <p:ext uri="{BB962C8B-B14F-4D97-AF65-F5344CB8AC3E}">
-        <p14:creationId xmlns:p14="http://schemas.microsoft.com/office/powerpoint/2010/main" val="3711738761"/>
+        <p14:creationId xmlns:p14="http://schemas.microsoft.com/office/powerpoint/2010/main" val="2979589427"/>
       </p:ext>
     </p:extLst>
   </p:cSld>
@@ -5995,30 +6524,266 @@
             <p:ph type="title"/>
           </p:nvPr>
         </p:nvSpPr>
+        <p:spPr/>
+        <p:txBody>
+          <a:bodyPr/>
+          <a:lstStyle/>
+          <a:p>
+            <a:r>
+              <a:rPr lang="en-US" sz="4400" b="1" dirty="0">
+                <a:solidFill>
+                  <a:prstClr val="black"/>
+                </a:solidFill>
+                <a:cs typeface="Arial" panose="020B0604020202020204" pitchFamily="34" charset="0"/>
+              </a:rPr>
+              <a:t>Method</a:t>
+            </a:r>
+            <a:endParaRPr lang="en-GB" b="1" dirty="0"/>
+          </a:p>
+        </p:txBody>
+      </p:sp>
+      <p:sp>
+        <p:nvSpPr>
+          <p:cNvPr id="4" name="Content Placeholder 2">
+            <a:extLst>
+              <a:ext uri="{FF2B5EF4-FFF2-40B4-BE49-F238E27FC236}">
+                <a16:creationId xmlns:a16="http://schemas.microsoft.com/office/drawing/2014/main" id="{511D9F8B-3BF0-CEF2-E14C-36FAE1E77A6B}"/>
+              </a:ext>
+            </a:extLst>
+          </p:cNvPr>
+          <p:cNvSpPr>
+            <a:spLocks noGrp="1"/>
+          </p:cNvSpPr>
+          <p:nvPr>
+            <p:ph idx="1"/>
+          </p:nvPr>
+        </p:nvSpPr>
         <p:spPr>
           <a:xfrm>
-            <a:off x="3777133" y="2226055"/>
-            <a:ext cx="4637734" cy="2405889"/>
+            <a:off x="838200" y="1825625"/>
+            <a:ext cx="8534400" cy="4351338"/>
           </a:xfrm>
         </p:spPr>
         <p:txBody>
-          <a:bodyPr>
-            <a:normAutofit/>
+          <a:bodyPr vert="horz" lIns="91440" tIns="45720" rIns="91440" bIns="45720" rtlCol="0" anchor="t">
+            <a:noAutofit/>
           </a:bodyPr>
           <a:lstStyle/>
           <a:p>
             <a:r>
-              <a:rPr lang="en-US" sz="6600" b="1" dirty="0"/>
-              <a:t>Questions?</a:t>
-            </a:r>
-            <a:endParaRPr lang="en-GB" sz="6600" b="1" dirty="0"/>
+              <a:rPr lang="en-US" sz="3200" dirty="0"/>
+              <a:t>Modified CNN </a:t>
+            </a:r>
+          </a:p>
+          <a:p>
+            <a:r>
+              <a:rPr lang="en-US" sz="3200" dirty="0"/>
+              <a:t>Meaningful first layer</a:t>
+            </a:r>
+          </a:p>
+          <a:p>
+            <a:r>
+              <a:rPr lang="en-US" sz="3200" dirty="0"/>
+              <a:t>Band pass filter (</a:t>
+            </a:r>
+            <a:r>
+              <a:rPr lang="en-US" sz="3200" dirty="0" err="1"/>
+              <a:t>freq</a:t>
+            </a:r>
+            <a:r>
+              <a:rPr lang="en-US" sz="3200" dirty="0"/>
+              <a:t>)</a:t>
+            </a:r>
+            <a:br>
+              <a:rPr lang="en-US" sz="3200" dirty="0"/>
+            </a:br>
+            <a:r>
+              <a:rPr lang="en-US" sz="3200" dirty="0"/>
+              <a:t> by </a:t>
+            </a:r>
+            <a:r>
+              <a:rPr lang="en-US" sz="3200" dirty="0" err="1"/>
+              <a:t>sinc</a:t>
+            </a:r>
+            <a:r>
+              <a:rPr lang="en-US" sz="3200" dirty="0"/>
+              <a:t> functions (time)</a:t>
+            </a:r>
+          </a:p>
+          <a:p>
+            <a:r>
+              <a:rPr lang="en-US" sz="3200" dirty="0"/>
+              <a:t>Regular CNN Pipeline</a:t>
+            </a:r>
+          </a:p>
+          <a:p>
+            <a:endParaRPr lang="en-US" sz="3200" dirty="0"/>
+          </a:p>
+          <a:p>
+            <a:endParaRPr lang="en-US" sz="3200" dirty="0"/>
+          </a:p>
+        </p:txBody>
+      </p:sp>
+      <p:sp>
+        <p:nvSpPr>
+          <p:cNvPr id="6" name="TextBox 5">
+            <a:extLst>
+              <a:ext uri="{FF2B5EF4-FFF2-40B4-BE49-F238E27FC236}">
+                <a16:creationId xmlns:a16="http://schemas.microsoft.com/office/drawing/2014/main" id="{CA28949E-6483-F0C5-E6CC-17E9301FBE8F}"/>
+              </a:ext>
+            </a:extLst>
+          </p:cNvPr>
+          <p:cNvSpPr txBox="1"/>
+          <p:nvPr/>
+        </p:nvSpPr>
+        <p:spPr>
+          <a:xfrm>
+            <a:off x="-57150" y="6607175"/>
+            <a:ext cx="12211050" cy="276999"/>
+          </a:xfrm>
+          <a:prstGeom prst="rect">
+            <a:avLst/>
+          </a:prstGeom>
+          <a:noFill/>
+        </p:spPr>
+        <p:txBody>
+          <a:bodyPr wrap="square" rtlCol="0">
+            <a:spAutoFit/>
+          </a:bodyPr>
+          <a:lstStyle/>
+          <a:p>
+            <a:r>
+              <a:rPr lang="en-US" sz="1200" u="none" strike="noStrike" dirty="0" err="1">
+                <a:solidFill>
+                  <a:srgbClr val="222222"/>
+                </a:solidFill>
+                <a:effectLst/>
+                <a:highlight>
+                  <a:srgbClr val="FFFFFF"/>
+                </a:highlight>
+                <a:latin typeface="Calibri" panose="020F0502020204030204" pitchFamily="34" charset="0"/>
+                <a:ea typeface="Calibri" panose="020F0502020204030204" pitchFamily="34" charset="0"/>
+                <a:cs typeface="Calibri" panose="020F0502020204030204" pitchFamily="34" charset="0"/>
+              </a:rPr>
+              <a:t>Ravanelli</a:t>
+            </a:r>
+            <a:r>
+              <a:rPr lang="en-US" sz="1200" u="none" strike="noStrike" dirty="0">
+                <a:solidFill>
+                  <a:srgbClr val="222222"/>
+                </a:solidFill>
+                <a:effectLst/>
+                <a:highlight>
+                  <a:srgbClr val="FFFFFF"/>
+                </a:highlight>
+                <a:latin typeface="Calibri" panose="020F0502020204030204" pitchFamily="34" charset="0"/>
+                <a:ea typeface="Calibri" panose="020F0502020204030204" pitchFamily="34" charset="0"/>
+                <a:cs typeface="Calibri" panose="020F0502020204030204" pitchFamily="34" charset="0"/>
+              </a:rPr>
+              <a:t>, M., &amp; </a:t>
+            </a:r>
+            <a:r>
+              <a:rPr lang="en-US" sz="1200" u="none" strike="noStrike" dirty="0" err="1">
+                <a:solidFill>
+                  <a:srgbClr val="222222"/>
+                </a:solidFill>
+                <a:effectLst/>
+                <a:highlight>
+                  <a:srgbClr val="FFFFFF"/>
+                </a:highlight>
+                <a:latin typeface="Calibri" panose="020F0502020204030204" pitchFamily="34" charset="0"/>
+                <a:ea typeface="Calibri" panose="020F0502020204030204" pitchFamily="34" charset="0"/>
+                <a:cs typeface="Calibri" panose="020F0502020204030204" pitchFamily="34" charset="0"/>
+              </a:rPr>
+              <a:t>Bengio</a:t>
+            </a:r>
+            <a:r>
+              <a:rPr lang="en-US" sz="1200" u="none" strike="noStrike" dirty="0">
+                <a:solidFill>
+                  <a:srgbClr val="222222"/>
+                </a:solidFill>
+                <a:effectLst/>
+                <a:highlight>
+                  <a:srgbClr val="FFFFFF"/>
+                </a:highlight>
+                <a:latin typeface="Calibri" panose="020F0502020204030204" pitchFamily="34" charset="0"/>
+                <a:ea typeface="Calibri" panose="020F0502020204030204" pitchFamily="34" charset="0"/>
+                <a:cs typeface="Calibri" panose="020F0502020204030204" pitchFamily="34" charset="0"/>
+              </a:rPr>
+              <a:t>, Y. (2018, December). Speaker recognition from raw waveform with </a:t>
+            </a:r>
+            <a:r>
+              <a:rPr lang="en-US" sz="1200" u="none" strike="noStrike" dirty="0" err="1">
+                <a:solidFill>
+                  <a:srgbClr val="222222"/>
+                </a:solidFill>
+                <a:effectLst/>
+                <a:highlight>
+                  <a:srgbClr val="FFFFFF"/>
+                </a:highlight>
+                <a:latin typeface="Calibri" panose="020F0502020204030204" pitchFamily="34" charset="0"/>
+                <a:ea typeface="Calibri" panose="020F0502020204030204" pitchFamily="34" charset="0"/>
+                <a:cs typeface="Calibri" panose="020F0502020204030204" pitchFamily="34" charset="0"/>
+              </a:rPr>
+              <a:t>sincnet</a:t>
+            </a:r>
+            <a:r>
+              <a:rPr lang="en-US" sz="1200" u="none" strike="noStrike" dirty="0">
+                <a:solidFill>
+                  <a:srgbClr val="222222"/>
+                </a:solidFill>
+                <a:effectLst/>
+                <a:highlight>
+                  <a:srgbClr val="FFFFFF"/>
+                </a:highlight>
+                <a:latin typeface="Calibri" panose="020F0502020204030204" pitchFamily="34" charset="0"/>
+                <a:ea typeface="Calibri" panose="020F0502020204030204" pitchFamily="34" charset="0"/>
+                <a:cs typeface="Calibri" panose="020F0502020204030204" pitchFamily="34" charset="0"/>
+              </a:rPr>
+              <a:t>. </a:t>
+            </a:r>
+            <a:r>
+              <a:rPr lang="he-IL" sz="1200" u="none" strike="noStrike" dirty="0">
+                <a:solidFill>
+                  <a:srgbClr val="222222"/>
+                </a:solidFill>
+                <a:effectLst/>
+                <a:highlight>
+                  <a:srgbClr val="FFFFFF"/>
+                </a:highlight>
+                <a:latin typeface="Calibri" panose="020F0502020204030204" pitchFamily="34" charset="0"/>
+                <a:ea typeface="Calibri" panose="020F0502020204030204" pitchFamily="34" charset="0"/>
+                <a:cs typeface="Calibri" panose="020F0502020204030204" pitchFamily="34" charset="0"/>
+              </a:rPr>
+              <a:t>In </a:t>
+            </a:r>
+            <a:r>
+              <a:rPr lang="he-IL" sz="1200" i="1" u="none" strike="noStrike" dirty="0">
+                <a:solidFill>
+                  <a:srgbClr val="222222"/>
+                </a:solidFill>
+                <a:effectLst/>
+                <a:highlight>
+                  <a:srgbClr val="FFFFFF"/>
+                </a:highlight>
+                <a:latin typeface="Calibri" panose="020F0502020204030204" pitchFamily="34" charset="0"/>
+                <a:ea typeface="Calibri" panose="020F0502020204030204" pitchFamily="34" charset="0"/>
+                <a:cs typeface="Calibri" panose="020F0502020204030204" pitchFamily="34" charset="0"/>
+              </a:rPr>
+              <a:t>2018 IEEE Spoken Language Technology Workshop (SLT)</a:t>
+            </a:r>
+            <a:endParaRPr lang="en-IL" sz="1200" u="none" strike="noStrike" dirty="0">
+              <a:effectLst/>
+              <a:latin typeface="Calibri" panose="020F0502020204030204" pitchFamily="34" charset="0"/>
+              <a:ea typeface="Calibri" panose="020F0502020204030204" pitchFamily="34" charset="0"/>
+            </a:endParaRPr>
           </a:p>
         </p:txBody>
       </p:sp>
     </p:spTree>
     <p:extLst>
       <p:ext uri="{BB962C8B-B14F-4D97-AF65-F5344CB8AC3E}">
-        <p14:creationId xmlns:p14="http://schemas.microsoft.com/office/powerpoint/2010/main" val="1778032345"/>
+        <p14:creationId xmlns:p14="http://schemas.microsoft.com/office/powerpoint/2010/main" val="243016868"/>
       </p:ext>
     </p:extLst>
   </p:cSld>
@@ -6321,4 +7086,272 @@
     </a:ext>
   </a:extLst>
 </a:theme>
+</file>
+
+<file path=customXml/item1.xml><?xml version="1.0" encoding="utf-8"?>
+<ct:contentTypeSchema xmlns:ct="http://schemas.microsoft.com/office/2006/metadata/contentType" xmlns:ma="http://schemas.microsoft.com/office/2006/metadata/properties/metaAttributes" ct:_="" ma:_="" ma:contentTypeName="Document" ma:contentTypeID="0x01010074138EDDC87026499C0508CF3F01DE5B" ma:contentTypeVersion="11" ma:contentTypeDescription="Create a new document." ma:contentTypeScope="" ma:versionID="f9ed57a46e7e9f360655942ff1da1b93">
+  <xsd:schema xmlns:xsd="http://www.w3.org/2001/XMLSchema" xmlns:xs="http://www.w3.org/2001/XMLSchema" xmlns:p="http://schemas.microsoft.com/office/2006/metadata/properties" xmlns:ns3="a7bf42cb-5e57-474b-bf80-7dc3a02029c8" xmlns:ns4="cc066106-5c9a-40d1-89fd-ed422cd1a907" targetNamespace="http://schemas.microsoft.com/office/2006/metadata/properties" ma:root="true" ma:fieldsID="2861f2ff153f8b799a4d00e904c70b5b" ns3:_="" ns4:_="">
+    <xsd:import namespace="a7bf42cb-5e57-474b-bf80-7dc3a02029c8"/>
+    <xsd:import namespace="cc066106-5c9a-40d1-89fd-ed422cd1a907"/>
+    <xsd:element name="properties">
+      <xsd:complexType>
+        <xsd:sequence>
+          <xsd:element name="documentManagement">
+            <xsd:complexType>
+              <xsd:all>
+                <xsd:element ref="ns3:MediaServiceMetadata" minOccurs="0"/>
+                <xsd:element ref="ns3:MediaServiceFastMetadata" minOccurs="0"/>
+                <xsd:element ref="ns3:MediaServiceAutoKeyPoints" minOccurs="0"/>
+                <xsd:element ref="ns3:MediaServiceKeyPoints" minOccurs="0"/>
+                <xsd:element ref="ns4:SharedWithUsers" minOccurs="0"/>
+                <xsd:element ref="ns4:SharedWithDetails" minOccurs="0"/>
+                <xsd:element ref="ns4:SharingHintHash" minOccurs="0"/>
+                <xsd:element ref="ns3:MediaServiceAutoTags" minOccurs="0"/>
+                <xsd:element ref="ns3:MediaServiceGenerationTime" minOccurs="0"/>
+                <xsd:element ref="ns3:MediaServiceEventHashCode" minOccurs="0"/>
+                <xsd:element ref="ns3:MediaServiceDateTaken" minOccurs="0"/>
+              </xsd:all>
+            </xsd:complexType>
+          </xsd:element>
+        </xsd:sequence>
+      </xsd:complexType>
+    </xsd:element>
+  </xsd:schema>
+  <xsd:schema xmlns:xsd="http://www.w3.org/2001/XMLSchema" xmlns:xs="http://www.w3.org/2001/XMLSchema" xmlns:dms="http://schemas.microsoft.com/office/2006/documentManagement/types" xmlns:pc="http://schemas.microsoft.com/office/infopath/2007/PartnerControls" targetNamespace="a7bf42cb-5e57-474b-bf80-7dc3a02029c8" elementFormDefault="qualified">
+    <xsd:import namespace="http://schemas.microsoft.com/office/2006/documentManagement/types"/>
+    <xsd:import namespace="http://schemas.microsoft.com/office/infopath/2007/PartnerControls"/>
+    <xsd:element name="MediaServiceMetadata" ma:index="8" nillable="true" ma:displayName="MediaServiceMetadata" ma:hidden="true" ma:internalName="MediaServiceMetadata" ma:readOnly="true">
+      <xsd:simpleType>
+        <xsd:restriction base="dms:Note"/>
+      </xsd:simpleType>
+    </xsd:element>
+    <xsd:element name="MediaServiceFastMetadata" ma:index="9" nillable="true" ma:displayName="MediaServiceFastMetadata" ma:hidden="true" ma:internalName="MediaServiceFastMetadata" ma:readOnly="true">
+      <xsd:simpleType>
+        <xsd:restriction base="dms:Note"/>
+      </xsd:simpleType>
+    </xsd:element>
+    <xsd:element name="MediaServiceAutoKeyPoints" ma:index="10" nillable="true" ma:displayName="MediaServiceAutoKeyPoints" ma:hidden="true" ma:internalName="MediaServiceAutoKeyPoints" ma:readOnly="true">
+      <xsd:simpleType>
+        <xsd:restriction base="dms:Note"/>
+      </xsd:simpleType>
+    </xsd:element>
+    <xsd:element name="MediaServiceKeyPoints" ma:index="11" nillable="true" ma:displayName="KeyPoints" ma:internalName="MediaServiceKeyPoints" ma:readOnly="true">
+      <xsd:simpleType>
+        <xsd:restriction base="dms:Note">
+          <xsd:maxLength value="255"/>
+        </xsd:restriction>
+      </xsd:simpleType>
+    </xsd:element>
+    <xsd:element name="MediaServiceAutoTags" ma:index="15" nillable="true" ma:displayName="Tags" ma:internalName="MediaServiceAutoTags" ma:readOnly="true">
+      <xsd:simpleType>
+        <xsd:restriction base="dms:Text"/>
+      </xsd:simpleType>
+    </xsd:element>
+    <xsd:element name="MediaServiceGenerationTime" ma:index="16" nillable="true" ma:displayName="MediaServiceGenerationTime" ma:hidden="true" ma:internalName="MediaServiceGenerationTime" ma:readOnly="true">
+      <xsd:simpleType>
+        <xsd:restriction base="dms:Text"/>
+      </xsd:simpleType>
+    </xsd:element>
+    <xsd:element name="MediaServiceEventHashCode" ma:index="17" nillable="true" ma:displayName="MediaServiceEventHashCode" ma:hidden="true" ma:internalName="MediaServiceEventHashCode" ma:readOnly="true">
+      <xsd:simpleType>
+        <xsd:restriction base="dms:Text"/>
+      </xsd:simpleType>
+    </xsd:element>
+    <xsd:element name="MediaServiceDateTaken" ma:index="18" nillable="true" ma:displayName="MediaServiceDateTaken" ma:hidden="true" ma:internalName="MediaServiceDateTaken" ma:readOnly="true">
+      <xsd:simpleType>
+        <xsd:restriction base="dms:Text"/>
+      </xsd:simpleType>
+    </xsd:element>
+  </xsd:schema>
+  <xsd:schema xmlns:xsd="http://www.w3.org/2001/XMLSchema" xmlns:xs="http://www.w3.org/2001/XMLSchema" xmlns:dms="http://schemas.microsoft.com/office/2006/documentManagement/types" xmlns:pc="http://schemas.microsoft.com/office/infopath/2007/PartnerControls" targetNamespace="cc066106-5c9a-40d1-89fd-ed422cd1a907" elementFormDefault="qualified">
+    <xsd:import namespace="http://schemas.microsoft.com/office/2006/documentManagement/types"/>
+    <xsd:import namespace="http://schemas.microsoft.com/office/infopath/2007/PartnerControls"/>
+    <xsd:element name="SharedWithUsers" ma:index="12" nillable="true" ma:displayName="Shared With" ma:internalName="SharedWithUsers" ma:readOnly="true">
+      <xsd:complexType>
+        <xsd:complexContent>
+          <xsd:extension base="dms:UserMulti">
+            <xsd:sequence>
+              <xsd:element name="UserInfo" minOccurs="0" maxOccurs="unbounded">
+                <xsd:complexType>
+                  <xsd:sequence>
+                    <xsd:element name="DisplayName" type="xsd:string" minOccurs="0"/>
+                    <xsd:element name="AccountId" type="dms:UserId" minOccurs="0" nillable="true"/>
+                    <xsd:element name="AccountType" type="xsd:string" minOccurs="0"/>
+                  </xsd:sequence>
+                </xsd:complexType>
+              </xsd:element>
+            </xsd:sequence>
+          </xsd:extension>
+        </xsd:complexContent>
+      </xsd:complexType>
+    </xsd:element>
+    <xsd:element name="SharedWithDetails" ma:index="13" nillable="true" ma:displayName="Shared With Details" ma:internalName="SharedWithDetails" ma:readOnly="true">
+      <xsd:simpleType>
+        <xsd:restriction base="dms:Note">
+          <xsd:maxLength value="255"/>
+        </xsd:restriction>
+      </xsd:simpleType>
+    </xsd:element>
+    <xsd:element name="SharingHintHash" ma:index="14" nillable="true" ma:displayName="Sharing Hint Hash" ma:hidden="true" ma:internalName="SharingHintHash" ma:readOnly="true">
+      <xsd:simpleType>
+        <xsd:restriction base="dms:Text"/>
+      </xsd:simpleType>
+    </xsd:element>
+  </xsd:schema>
+  <xsd:schema xmlns="http://schemas.openxmlformats.org/package/2006/metadata/core-properties" xmlns:xsd="http://www.w3.org/2001/XMLSchema" xmlns:xsi="http://www.w3.org/2001/XMLSchema-instance" xmlns:dc="http://purl.org/dc/elements/1.1/" xmlns:dcterms="http://purl.org/dc/terms/" xmlns:odoc="http://schemas.microsoft.com/internal/obd" targetNamespace="http://schemas.openxmlformats.org/package/2006/metadata/core-properties" elementFormDefault="qualified" attributeFormDefault="unqualified" blockDefault="#all">
+    <xsd:import namespace="http://purl.org/dc/elements/1.1/" schemaLocation="http://dublincore.org/schemas/xmls/qdc/2003/04/02/dc.xsd"/>
+    <xsd:import namespace="http://purl.org/dc/terms/" schemaLocation="http://dublincore.org/schemas/xmls/qdc/2003/04/02/dcterms.xsd"/>
+    <xsd:element name="coreProperties" type="CT_coreProperties"/>
+    <xsd:complexType name="CT_coreProperties">
+      <xsd:all>
+        <xsd:element ref="dc:creator" minOccurs="0" maxOccurs="1"/>
+        <xsd:element ref="dcterms:created" minOccurs="0" maxOccurs="1"/>
+        <xsd:element ref="dc:identifier" minOccurs="0" maxOccurs="1"/>
+        <xsd:element name="contentType" minOccurs="0" maxOccurs="1" type="xsd:string" ma:index="0" ma:displayName="Content Type"/>
+        <xsd:element ref="dc:title" minOccurs="0" maxOccurs="1" ma:index="4" ma:displayName="Title"/>
+        <xsd:element ref="dc:subject" minOccurs="0" maxOccurs="1"/>
+        <xsd:element ref="dc:description" minOccurs="0" maxOccurs="1"/>
+        <xsd:element name="keywords" minOccurs="0" maxOccurs="1" type="xsd:string"/>
+        <xsd:element ref="dc:language" minOccurs="0" maxOccurs="1"/>
+        <xsd:element name="category" minOccurs="0" maxOccurs="1" type="xsd:string"/>
+        <xsd:element name="version" minOccurs="0" maxOccurs="1" type="xsd:string"/>
+        <xsd:element name="revision" minOccurs="0" maxOccurs="1" type="xsd:string">
+          <xsd:annotation>
+            <xsd:documentation>
+                        This value indicates the number of saves or revisions. The application is responsible for updating this value after each revision.
+                    </xsd:documentation>
+          </xsd:annotation>
+        </xsd:element>
+        <xsd:element name="lastModifiedBy" minOccurs="0" maxOccurs="1" type="xsd:string"/>
+        <xsd:element ref="dcterms:modified" minOccurs="0" maxOccurs="1"/>
+        <xsd:element name="contentStatus" minOccurs="0" maxOccurs="1" type="xsd:string"/>
+      </xsd:all>
+    </xsd:complexType>
+  </xsd:schema>
+  <xs:schema xmlns:pc="http://schemas.microsoft.com/office/infopath/2007/PartnerControls" xmlns:xs="http://www.w3.org/2001/XMLSchema" targetNamespace="http://schemas.microsoft.com/office/infopath/2007/PartnerControls" elementFormDefault="qualified" attributeFormDefault="unqualified">
+    <xs:element name="Person">
+      <xs:complexType>
+        <xs:sequence>
+          <xs:element ref="pc:DisplayName" minOccurs="0"/>
+          <xs:element ref="pc:AccountId" minOccurs="0"/>
+          <xs:element ref="pc:AccountType" minOccurs="0"/>
+        </xs:sequence>
+      </xs:complexType>
+    </xs:element>
+    <xs:element name="DisplayName" type="xs:string"/>
+    <xs:element name="AccountId" type="xs:string"/>
+    <xs:element name="AccountType" type="xs:string"/>
+    <xs:element name="BDCAssociatedEntity">
+      <xs:complexType>
+        <xs:sequence>
+          <xs:element ref="pc:BDCEntity" minOccurs="0" maxOccurs="unbounded"/>
+        </xs:sequence>
+        <xs:attribute ref="pc:EntityNamespace"/>
+        <xs:attribute ref="pc:EntityName"/>
+        <xs:attribute ref="pc:SystemInstanceName"/>
+        <xs:attribute ref="pc:AssociationName"/>
+      </xs:complexType>
+    </xs:element>
+    <xs:attribute name="EntityNamespace" type="xs:string"/>
+    <xs:attribute name="EntityName" type="xs:string"/>
+    <xs:attribute name="SystemInstanceName" type="xs:string"/>
+    <xs:attribute name="AssociationName" type="xs:string"/>
+    <xs:element name="BDCEntity">
+      <xs:complexType>
+        <xs:sequence>
+          <xs:element ref="pc:EntityDisplayName" minOccurs="0"/>
+          <xs:element ref="pc:EntityInstanceReference" minOccurs="0"/>
+          <xs:element ref="pc:EntityId1" minOccurs="0"/>
+          <xs:element ref="pc:EntityId2" minOccurs="0"/>
+          <xs:element ref="pc:EntityId3" minOccurs="0"/>
+          <xs:element ref="pc:EntityId4" minOccurs="0"/>
+          <xs:element ref="pc:EntityId5" minOccurs="0"/>
+        </xs:sequence>
+      </xs:complexType>
+    </xs:element>
+    <xs:element name="EntityDisplayName" type="xs:string"/>
+    <xs:element name="EntityInstanceReference" type="xs:string"/>
+    <xs:element name="EntityId1" type="xs:string"/>
+    <xs:element name="EntityId2" type="xs:string"/>
+    <xs:element name="EntityId3" type="xs:string"/>
+    <xs:element name="EntityId4" type="xs:string"/>
+    <xs:element name="EntityId5" type="xs:string"/>
+    <xs:element name="Terms">
+      <xs:complexType>
+        <xs:sequence>
+          <xs:element ref="pc:TermInfo" minOccurs="0" maxOccurs="unbounded"/>
+        </xs:sequence>
+      </xs:complexType>
+    </xs:element>
+    <xs:element name="TermInfo">
+      <xs:complexType>
+        <xs:sequence>
+          <xs:element ref="pc:TermName" minOccurs="0"/>
+          <xs:element ref="pc:TermId" minOccurs="0"/>
+        </xs:sequence>
+      </xs:complexType>
+    </xs:element>
+    <xs:element name="TermName" type="xs:string"/>
+    <xs:element name="TermId" type="xs:string"/>
+  </xs:schema>
+</ct:contentTypeSchema>
+</file>
+
+<file path=customXml/item2.xml><?xml version="1.0" encoding="utf-8"?>
+<?mso-contentType ?>
+<FormTemplates xmlns="http://schemas.microsoft.com/sharepoint/v3/contenttype/forms">
+  <Display>DocumentLibraryForm</Display>
+  <Edit>DocumentLibraryForm</Edit>
+  <New>DocumentLibraryForm</New>
+</FormTemplates>
+</file>
+
+<file path=customXml/item3.xml><?xml version="1.0" encoding="utf-8"?>
+<p:properties xmlns:p="http://schemas.microsoft.com/office/2006/metadata/properties" xmlns:xsi="http://www.w3.org/2001/XMLSchema-instance" xmlns:pc="http://schemas.microsoft.com/office/infopath/2007/PartnerControls">
+  <documentManagement/>
+</p:properties>
+</file>
+
+<file path=customXml/itemProps1.xml><?xml version="1.0" encoding="utf-8"?>
+<ds:datastoreItem xmlns:ds="http://schemas.openxmlformats.org/officeDocument/2006/customXml" ds:itemID="{0047E0DB-9439-4A76-9A8E-53A56B7C7075}">
+  <ds:schemaRefs>
+    <ds:schemaRef ds:uri="http://schemas.microsoft.com/office/2006/metadata/contentType"/>
+    <ds:schemaRef ds:uri="http://schemas.microsoft.com/office/2006/metadata/properties/metaAttributes"/>
+    <ds:schemaRef ds:uri="http://www.w3.org/2001/XMLSchema"/>
+    <ds:schemaRef ds:uri="http://schemas.microsoft.com/office/2006/metadata/properties"/>
+    <ds:schemaRef ds:uri="a7bf42cb-5e57-474b-bf80-7dc3a02029c8"/>
+    <ds:schemaRef ds:uri="cc066106-5c9a-40d1-89fd-ed422cd1a907"/>
+    <ds:schemaRef ds:uri="http://schemas.microsoft.com/office/2006/documentManagement/types"/>
+    <ds:schemaRef ds:uri="http://schemas.microsoft.com/office/infopath/2007/PartnerControls"/>
+    <ds:schemaRef ds:uri="http://schemas.openxmlformats.org/package/2006/metadata/core-properties"/>
+    <ds:schemaRef ds:uri="http://purl.org/dc/elements/1.1/"/>
+    <ds:schemaRef ds:uri="http://purl.org/dc/terms/"/>
+    <ds:schemaRef ds:uri="http://schemas.microsoft.com/internal/obd"/>
+  </ds:schemaRefs>
+</ds:datastoreItem>
+</file>
+
+<file path=customXml/itemProps2.xml><?xml version="1.0" encoding="utf-8"?>
+<ds:datastoreItem xmlns:ds="http://schemas.openxmlformats.org/officeDocument/2006/customXml" ds:itemID="{391D4464-4553-483F-8EEB-B4673AD40EBA}">
+  <ds:schemaRefs>
+    <ds:schemaRef ds:uri="http://schemas.microsoft.com/sharepoint/v3/contenttype/forms"/>
+  </ds:schemaRefs>
+</ds:datastoreItem>
+</file>
+
+<file path=customXml/itemProps3.xml><?xml version="1.0" encoding="utf-8"?>
+<ds:datastoreItem xmlns:ds="http://schemas.openxmlformats.org/officeDocument/2006/customXml" ds:itemID="{C51A5C83-F58D-453B-ADE1-432966BD3193}">
+  <ds:schemaRefs>
+    <ds:schemaRef ds:uri="http://www.w3.org/XML/1998/namespace"/>
+    <ds:schemaRef ds:uri="http://purl.org/dc/terms/"/>
+    <ds:schemaRef ds:uri="http://purl.org/dc/dcmitype/"/>
+    <ds:schemaRef ds:uri="http://schemas.microsoft.com/office/2006/documentManagement/types"/>
+    <ds:schemaRef ds:uri="http://schemas.microsoft.com/office/2006/metadata/properties"/>
+    <ds:schemaRef ds:uri="http://schemas.openxmlformats.org/package/2006/metadata/core-properties"/>
+    <ds:schemaRef ds:uri="http://schemas.microsoft.com/office/infopath/2007/PartnerControls"/>
+    <ds:schemaRef ds:uri="cc066106-5c9a-40d1-89fd-ed422cd1a907"/>
+    <ds:schemaRef ds:uri="a7bf42cb-5e57-474b-bf80-7dc3a02029c8"/>
+    <ds:schemaRef ds:uri="http://purl.org/dc/elements/1.1/"/>
+  </ds:schemaRefs>
+</ds:datastoreItem>
 </file>
</xml_diff>